<commit_message>
IMMD, parasitic model results are took for 2 different situation
input resistance is 0.1 ohm and 20 ohm
</commit_message>
<xml_diff>
--- a/Reports/IMMD/Impedance_model_2.pptx
+++ b/Reports/IMMD/Impedance_model_2.pptx
@@ -5,7 +5,7 @@
     <p:sldMasterId id="2147483648" r:id="rId1"/>
   </p:sldMasterIdLst>
   <p:notesMasterIdLst>
-    <p:notesMasterId r:id="rId14"/>
+    <p:notesMasterId r:id="rId15"/>
   </p:notesMasterIdLst>
   <p:sldIdLst>
     <p:sldId id="256" r:id="rId2"/>
@@ -13,13 +13,14 @@
     <p:sldId id="259" r:id="rId4"/>
     <p:sldId id="260" r:id="rId5"/>
     <p:sldId id="261" r:id="rId6"/>
-    <p:sldId id="262" r:id="rId7"/>
-    <p:sldId id="263" r:id="rId8"/>
-    <p:sldId id="264" r:id="rId9"/>
-    <p:sldId id="265" r:id="rId10"/>
-    <p:sldId id="267" r:id="rId11"/>
-    <p:sldId id="268" r:id="rId12"/>
-    <p:sldId id="269" r:id="rId13"/>
+    <p:sldId id="263" r:id="rId7"/>
+    <p:sldId id="268" r:id="rId8"/>
+    <p:sldId id="265" r:id="rId9"/>
+    <p:sldId id="267" r:id="rId10"/>
+    <p:sldId id="269" r:id="rId11"/>
+    <p:sldId id="270" r:id="rId12"/>
+    <p:sldId id="272" r:id="rId13"/>
+    <p:sldId id="271" r:id="rId14"/>
   </p:sldIdLst>
   <p:sldSz cx="12192000" cy="6858000"/>
   <p:notesSz cx="6858000" cy="9144000"/>
@@ -208,7 +209,7 @@
           <a:p>
             <a:fld id="{5E5D0901-BCBD-4760-95BC-25F7409756D6}" type="datetimeFigureOut">
               <a:rPr lang="en-US" smtClean="0"/>
-              <a:t>5/10/2020</a:t>
+              <a:t>5/11/2020</a:t>
             </a:fld>
             <a:endParaRPr lang="en-US"/>
           </a:p>
@@ -790,7 +791,7 @@
           <a:p>
             <a:fld id="{270FDE6A-71E9-4752-989C-D4F3E748F949}" type="datetimeFigureOut">
               <a:rPr lang="en-US" smtClean="0"/>
-              <a:t>5/10/2020</a:t>
+              <a:t>5/11/2020</a:t>
             </a:fld>
             <a:endParaRPr lang="en-US"/>
           </a:p>
@@ -988,7 +989,7 @@
           <a:p>
             <a:fld id="{270FDE6A-71E9-4752-989C-D4F3E748F949}" type="datetimeFigureOut">
               <a:rPr lang="en-US" smtClean="0"/>
-              <a:t>5/10/2020</a:t>
+              <a:t>5/11/2020</a:t>
             </a:fld>
             <a:endParaRPr lang="en-US"/>
           </a:p>
@@ -1196,7 +1197,7 @@
           <a:p>
             <a:fld id="{270FDE6A-71E9-4752-989C-D4F3E748F949}" type="datetimeFigureOut">
               <a:rPr lang="en-US" smtClean="0"/>
-              <a:t>5/10/2020</a:t>
+              <a:t>5/11/2020</a:t>
             </a:fld>
             <a:endParaRPr lang="en-US"/>
           </a:p>
@@ -1394,7 +1395,7 @@
           <a:p>
             <a:fld id="{270FDE6A-71E9-4752-989C-D4F3E748F949}" type="datetimeFigureOut">
               <a:rPr lang="en-US" smtClean="0"/>
-              <a:t>5/10/2020</a:t>
+              <a:t>5/11/2020</a:t>
             </a:fld>
             <a:endParaRPr lang="en-US"/>
           </a:p>
@@ -1669,7 +1670,7 @@
           <a:p>
             <a:fld id="{270FDE6A-71E9-4752-989C-D4F3E748F949}" type="datetimeFigureOut">
               <a:rPr lang="en-US" smtClean="0"/>
-              <a:t>5/10/2020</a:t>
+              <a:t>5/11/2020</a:t>
             </a:fld>
             <a:endParaRPr lang="en-US"/>
           </a:p>
@@ -1934,7 +1935,7 @@
           <a:p>
             <a:fld id="{270FDE6A-71E9-4752-989C-D4F3E748F949}" type="datetimeFigureOut">
               <a:rPr lang="en-US" smtClean="0"/>
-              <a:t>5/10/2020</a:t>
+              <a:t>5/11/2020</a:t>
             </a:fld>
             <a:endParaRPr lang="en-US"/>
           </a:p>
@@ -2346,7 +2347,7 @@
           <a:p>
             <a:fld id="{270FDE6A-71E9-4752-989C-D4F3E748F949}" type="datetimeFigureOut">
               <a:rPr lang="en-US" smtClean="0"/>
-              <a:t>5/10/2020</a:t>
+              <a:t>5/11/2020</a:t>
             </a:fld>
             <a:endParaRPr lang="en-US"/>
           </a:p>
@@ -2487,7 +2488,7 @@
           <a:p>
             <a:fld id="{270FDE6A-71E9-4752-989C-D4F3E748F949}" type="datetimeFigureOut">
               <a:rPr lang="en-US" smtClean="0"/>
-              <a:t>5/10/2020</a:t>
+              <a:t>5/11/2020</a:t>
             </a:fld>
             <a:endParaRPr lang="en-US"/>
           </a:p>
@@ -2600,7 +2601,7 @@
           <a:p>
             <a:fld id="{270FDE6A-71E9-4752-989C-D4F3E748F949}" type="datetimeFigureOut">
               <a:rPr lang="en-US" smtClean="0"/>
-              <a:t>5/10/2020</a:t>
+              <a:t>5/11/2020</a:t>
             </a:fld>
             <a:endParaRPr lang="en-US"/>
           </a:p>
@@ -2911,7 +2912,7 @@
           <a:p>
             <a:fld id="{270FDE6A-71E9-4752-989C-D4F3E748F949}" type="datetimeFigureOut">
               <a:rPr lang="en-US" smtClean="0"/>
-              <a:t>5/10/2020</a:t>
+              <a:t>5/11/2020</a:t>
             </a:fld>
             <a:endParaRPr lang="en-US"/>
           </a:p>
@@ -3199,7 +3200,7 @@
           <a:p>
             <a:fld id="{270FDE6A-71E9-4752-989C-D4F3E748F949}" type="datetimeFigureOut">
               <a:rPr lang="en-US" smtClean="0"/>
-              <a:t>5/10/2020</a:t>
+              <a:t>5/11/2020</a:t>
             </a:fld>
             <a:endParaRPr lang="en-US"/>
           </a:p>
@@ -3440,7 +3441,7 @@
           <a:p>
             <a:fld id="{270FDE6A-71E9-4752-989C-D4F3E748F949}" type="datetimeFigureOut">
               <a:rPr lang="en-US" smtClean="0"/>
-              <a:t>5/10/2020</a:t>
+              <a:t>5/11/2020</a:t>
             </a:fld>
             <a:endParaRPr lang="en-US"/>
           </a:p>
@@ -4699,10 +4700,80 @@
           <a:chExt cx="0" cy="0"/>
         </a:xfrm>
       </p:grpSpPr>
+      <p:pic>
+        <p:nvPicPr>
+          <p:cNvPr id="2" name="Picture 1">
+            <a:extLst>
+              <a:ext uri="{FF2B5EF4-FFF2-40B4-BE49-F238E27FC236}">
+                <a16:creationId xmlns:a16="http://schemas.microsoft.com/office/drawing/2014/main" id="{BD6AEA8E-250B-4692-919B-4CB43AC8F77F}"/>
+              </a:ext>
+            </a:extLst>
+          </p:cNvPr>
+          <p:cNvPicPr>
+            <a:picLocks noChangeAspect="1"/>
+          </p:cNvPicPr>
+          <p:nvPr/>
+        </p:nvPicPr>
+        <p:blipFill>
+          <a:blip r:embed="rId2"/>
+          <a:stretch>
+            <a:fillRect/>
+          </a:stretch>
+        </p:blipFill>
+        <p:spPr>
+          <a:xfrm>
+            <a:off x="553791" y="360608"/>
+            <a:ext cx="10886035" cy="5875766"/>
+          </a:xfrm>
+          <a:prstGeom prst="rect">
+            <a:avLst/>
+          </a:prstGeom>
+        </p:spPr>
+      </p:pic>
+      <p:sp>
+        <p:nvSpPr>
+          <p:cNvPr id="3" name="Title 1">
+            <a:extLst>
+              <a:ext uri="{FF2B5EF4-FFF2-40B4-BE49-F238E27FC236}">
+                <a16:creationId xmlns:a16="http://schemas.microsoft.com/office/drawing/2014/main" id="{F88269FE-2BD1-4E9E-85A1-94B8F598C161}"/>
+              </a:ext>
+            </a:extLst>
+          </p:cNvPr>
+          <p:cNvSpPr>
+            <a:spLocks noGrp="1"/>
+          </p:cNvSpPr>
+          <p:nvPr>
+            <p:ph type="title"/>
+          </p:nvPr>
+        </p:nvSpPr>
+        <p:spPr>
+          <a:xfrm>
+            <a:off x="3670477" y="28641"/>
+            <a:ext cx="10065913" cy="563787"/>
+          </a:xfrm>
+        </p:spPr>
+        <p:txBody>
+          <a:bodyPr>
+            <a:normAutofit fontScale="90000"/>
+          </a:bodyPr>
+          <a:lstStyle/>
+          <a:p>
+            <a:r>
+              <a:rPr lang="tr-TR" dirty="0" err="1"/>
+              <a:t>Rin</a:t>
+            </a:r>
+            <a:r>
+              <a:rPr lang="tr-TR" dirty="0"/>
+              <a:t>=0.1</a:t>
+            </a:r>
+            <a:endParaRPr lang="en-US" dirty="0"/>
+          </a:p>
+        </p:txBody>
+      </p:sp>
     </p:spTree>
     <p:extLst>
       <p:ext uri="{BB962C8B-B14F-4D97-AF65-F5344CB8AC3E}">
-        <p14:creationId xmlns:p14="http://schemas.microsoft.com/office/powerpoint/2010/main" val="3103121416"/>
+        <p14:creationId xmlns:p14="http://schemas.microsoft.com/office/powerpoint/2010/main" val="1546372979"/>
       </p:ext>
     </p:extLst>
   </p:cSld>
@@ -4729,10 +4800,80 @@
           <a:chExt cx="0" cy="0"/>
         </a:xfrm>
       </p:grpSpPr>
+      <p:pic>
+        <p:nvPicPr>
+          <p:cNvPr id="4" name="Picture 3">
+            <a:extLst>
+              <a:ext uri="{FF2B5EF4-FFF2-40B4-BE49-F238E27FC236}">
+                <a16:creationId xmlns:a16="http://schemas.microsoft.com/office/drawing/2014/main" id="{35B4F19A-B08B-4797-82C0-C4AC2B21129B}"/>
+              </a:ext>
+            </a:extLst>
+          </p:cNvPr>
+          <p:cNvPicPr>
+            <a:picLocks noChangeAspect="1"/>
+          </p:cNvPicPr>
+          <p:nvPr/>
+        </p:nvPicPr>
+        <p:blipFill>
+          <a:blip r:embed="rId2"/>
+          <a:stretch>
+            <a:fillRect/>
+          </a:stretch>
+        </p:blipFill>
+        <p:spPr>
+          <a:xfrm>
+            <a:off x="47740" y="399245"/>
+            <a:ext cx="12096520" cy="6858000"/>
+          </a:xfrm>
+          <a:prstGeom prst="rect">
+            <a:avLst/>
+          </a:prstGeom>
+        </p:spPr>
+      </p:pic>
+      <p:sp>
+        <p:nvSpPr>
+          <p:cNvPr id="5" name="Title 1">
+            <a:extLst>
+              <a:ext uri="{FF2B5EF4-FFF2-40B4-BE49-F238E27FC236}">
+                <a16:creationId xmlns:a16="http://schemas.microsoft.com/office/drawing/2014/main" id="{37C7EE60-A101-4C89-89EE-F3511A89061A}"/>
+              </a:ext>
+            </a:extLst>
+          </p:cNvPr>
+          <p:cNvSpPr>
+            <a:spLocks noGrp="1"/>
+          </p:cNvSpPr>
+          <p:nvPr>
+            <p:ph type="title"/>
+          </p:nvPr>
+        </p:nvSpPr>
+        <p:spPr>
+          <a:xfrm>
+            <a:off x="3670477" y="28641"/>
+            <a:ext cx="10065913" cy="563787"/>
+          </a:xfrm>
+        </p:spPr>
+        <p:txBody>
+          <a:bodyPr>
+            <a:normAutofit fontScale="90000"/>
+          </a:bodyPr>
+          <a:lstStyle/>
+          <a:p>
+            <a:r>
+              <a:rPr lang="tr-TR" dirty="0" err="1"/>
+              <a:t>Rin</a:t>
+            </a:r>
+            <a:r>
+              <a:rPr lang="tr-TR" dirty="0"/>
+              <a:t>=20</a:t>
+            </a:r>
+            <a:endParaRPr lang="en-US" dirty="0"/>
+          </a:p>
+        </p:txBody>
+      </p:sp>
     </p:spTree>
     <p:extLst>
       <p:ext uri="{BB962C8B-B14F-4D97-AF65-F5344CB8AC3E}">
-        <p14:creationId xmlns:p14="http://schemas.microsoft.com/office/powerpoint/2010/main" val="2333719302"/>
+        <p14:creationId xmlns:p14="http://schemas.microsoft.com/office/powerpoint/2010/main" val="4015090310"/>
       </p:ext>
     </p:extLst>
   </p:cSld>
@@ -4759,10 +4900,104 @@
           <a:chExt cx="0" cy="0"/>
         </a:xfrm>
       </p:grpSpPr>
+      <p:pic>
+        <p:nvPicPr>
+          <p:cNvPr id="4" name="Content Placeholder 3">
+            <a:extLst>
+              <a:ext uri="{FF2B5EF4-FFF2-40B4-BE49-F238E27FC236}">
+                <a16:creationId xmlns:a16="http://schemas.microsoft.com/office/drawing/2014/main" id="{050CF35C-982D-411B-BBBA-B184420D038D}"/>
+              </a:ext>
+            </a:extLst>
+          </p:cNvPr>
+          <p:cNvPicPr>
+            <a:picLocks noGrp="1" noChangeAspect="1"/>
+          </p:cNvPicPr>
+          <p:nvPr>
+            <p:ph idx="1"/>
+          </p:nvPr>
+        </p:nvPicPr>
+        <p:blipFill>
+          <a:blip r:embed="rId2"/>
+          <a:stretch>
+            <a:fillRect/>
+          </a:stretch>
+        </p:blipFill>
+        <p:spPr>
+          <a:xfrm>
+            <a:off x="2095362" y="1075685"/>
+            <a:ext cx="8119688" cy="4351338"/>
+          </a:xfrm>
+          <a:prstGeom prst="rect">
+            <a:avLst/>
+          </a:prstGeom>
+        </p:spPr>
+      </p:pic>
     </p:spTree>
     <p:extLst>
       <p:ext uri="{BB962C8B-B14F-4D97-AF65-F5344CB8AC3E}">
-        <p14:creationId xmlns:p14="http://schemas.microsoft.com/office/powerpoint/2010/main" val="1546372979"/>
+        <p14:creationId xmlns:p14="http://schemas.microsoft.com/office/powerpoint/2010/main" val="3918566158"/>
+      </p:ext>
+    </p:extLst>
+  </p:cSld>
+  <p:clrMapOvr>
+    <a:masterClrMapping/>
+  </p:clrMapOvr>
+</p:sld>
+</file>
+
+<file path=ppt/slides/slide13.xml><?xml version="1.0" encoding="utf-8"?>
+<p:sld xmlns:a="http://schemas.openxmlformats.org/drawingml/2006/main" xmlns:r="http://schemas.openxmlformats.org/officeDocument/2006/relationships" xmlns:p="http://schemas.openxmlformats.org/presentationml/2006/main">
+  <p:cSld>
+    <p:spTree>
+      <p:nvGrpSpPr>
+        <p:cNvPr id="1" name=""/>
+        <p:cNvGrpSpPr/>
+        <p:nvPr/>
+      </p:nvGrpSpPr>
+      <p:grpSpPr>
+        <a:xfrm>
+          <a:off x="0" y="0"/>
+          <a:ext cx="0" cy="0"/>
+          <a:chOff x="0" y="0"/>
+          <a:chExt cx="0" cy="0"/>
+        </a:xfrm>
+      </p:grpSpPr>
+      <p:pic>
+        <p:nvPicPr>
+          <p:cNvPr id="7" name="Content Placeholder 6">
+            <a:extLst>
+              <a:ext uri="{FF2B5EF4-FFF2-40B4-BE49-F238E27FC236}">
+                <a16:creationId xmlns:a16="http://schemas.microsoft.com/office/drawing/2014/main" id="{9487AD56-6337-486D-BA55-4D090B473B2C}"/>
+              </a:ext>
+            </a:extLst>
+          </p:cNvPr>
+          <p:cNvPicPr>
+            <a:picLocks noGrp="1" noChangeAspect="1"/>
+          </p:cNvPicPr>
+          <p:nvPr>
+            <p:ph idx="1"/>
+          </p:nvPr>
+        </p:nvPicPr>
+        <p:blipFill>
+          <a:blip r:embed="rId2"/>
+          <a:stretch>
+            <a:fillRect/>
+          </a:stretch>
+        </p:blipFill>
+        <p:spPr>
+          <a:xfrm>
+            <a:off x="2337257" y="528599"/>
+            <a:ext cx="7096465" cy="5444434"/>
+          </a:xfrm>
+          <a:prstGeom prst="rect">
+            <a:avLst/>
+          </a:prstGeom>
+        </p:spPr>
+      </p:pic>
+    </p:spTree>
+    <p:extLst>
+      <p:ext uri="{BB962C8B-B14F-4D97-AF65-F5344CB8AC3E}">
+        <p14:creationId xmlns:p14="http://schemas.microsoft.com/office/powerpoint/2010/main" val="2683693276"/>
       </p:ext>
     </p:extLst>
   </p:cSld>
@@ -4969,1215 +5204,36 @@
           <a:chExt cx="0" cy="0"/>
         </a:xfrm>
       </p:grpSpPr>
-      <p:sp>
-        <p:nvSpPr>
-          <p:cNvPr id="2" name="Rectangle 1">
-            <a:extLst>
-              <a:ext uri="{FF2B5EF4-FFF2-40B4-BE49-F238E27FC236}">
-                <a16:creationId xmlns:a16="http://schemas.microsoft.com/office/drawing/2014/main" id="{098C3040-ED0B-47F1-9FDD-F84986A5519B}"/>
-              </a:ext>
-            </a:extLst>
-          </p:cNvPr>
-          <p:cNvSpPr/>
+      <p:pic>
+        <p:nvPicPr>
+          <p:cNvPr id="5" name="Picture 4">
+            <a:extLst>
+              <a:ext uri="{FF2B5EF4-FFF2-40B4-BE49-F238E27FC236}">
+                <a16:creationId xmlns:a16="http://schemas.microsoft.com/office/drawing/2014/main" id="{8ECB8A94-3782-424A-820F-313B3731B415}"/>
+              </a:ext>
+            </a:extLst>
+          </p:cNvPr>
+          <p:cNvPicPr>
+            <a:picLocks noChangeAspect="1"/>
+          </p:cNvPicPr>
           <p:nvPr/>
-        </p:nvSpPr>
+        </p:nvPicPr>
+        <p:blipFill>
+          <a:blip r:embed="rId2"/>
+          <a:stretch>
+            <a:fillRect/>
+          </a:stretch>
+        </p:blipFill>
         <p:spPr>
           <a:xfrm>
-            <a:off x="3048000" y="-5065633"/>
-            <a:ext cx="6096000" cy="16989266"/>
+            <a:off x="302653" y="466004"/>
+            <a:ext cx="11024315" cy="5662917"/>
           </a:xfrm>
           <a:prstGeom prst="rect">
             <a:avLst/>
           </a:prstGeom>
         </p:spPr>
-        <p:txBody>
-          <a:bodyPr>
-            <a:spAutoFit/>
-          </a:bodyPr>
-          <a:lstStyle/>
-          <a:p>
-            <a:r>
-              <a:rPr lang="en-US" dirty="0">
-                <a:solidFill>
-                  <a:srgbClr val="228B22"/>
-                </a:solidFill>
-                <a:latin typeface="Courier New" panose="02070309020205020404" pitchFamily="49" charset="0"/>
-              </a:rPr>
-              <a:t>%% New merged </a:t>
-            </a:r>
-            <a:r>
-              <a:rPr lang="en-US" dirty="0" err="1">
-                <a:solidFill>
-                  <a:srgbClr val="228B22"/>
-                </a:solidFill>
-                <a:latin typeface="Courier New" panose="02070309020205020404" pitchFamily="49" charset="0"/>
-              </a:rPr>
-              <a:t>inducances</a:t>
-            </a:r>
-            <a:r>
-              <a:rPr lang="en-US" dirty="0">
-                <a:solidFill>
-                  <a:srgbClr val="228B22"/>
-                </a:solidFill>
-                <a:latin typeface="Courier New" panose="02070309020205020404" pitchFamily="49" charset="0"/>
-              </a:rPr>
-              <a:t> - </a:t>
-            </a:r>
-            <a:r>
-              <a:rPr lang="en-US" dirty="0" err="1">
-                <a:solidFill>
-                  <a:srgbClr val="228B22"/>
-                </a:solidFill>
-                <a:latin typeface="Courier New" panose="02070309020205020404" pitchFamily="49" charset="0"/>
-              </a:rPr>
-              <a:t>phA</a:t>
-            </a:r>
-            <a:endParaRPr lang="en-US" dirty="0">
-              <a:solidFill>
-                <a:srgbClr val="228B22"/>
-              </a:solidFill>
-              <a:latin typeface="Courier New" panose="02070309020205020404" pitchFamily="49" charset="0"/>
-            </a:endParaRPr>
-          </a:p>
-          <a:p>
-            <a:r>
-              <a:rPr lang="en-US" dirty="0">
-                <a:solidFill>
-                  <a:srgbClr val="000000"/>
-                </a:solidFill>
-                <a:latin typeface="Courier New" panose="02070309020205020404" pitchFamily="49" charset="0"/>
-              </a:rPr>
-              <a:t>L1_phA = </a:t>
-            </a:r>
-            <a:r>
-              <a:rPr lang="en-US" dirty="0" err="1">
-                <a:solidFill>
-                  <a:srgbClr val="000000"/>
-                </a:solidFill>
-                <a:latin typeface="Courier New" panose="02070309020205020404" pitchFamily="49" charset="0"/>
-              </a:rPr>
-              <a:t>LATop</a:t>
-            </a:r>
-            <a:r>
-              <a:rPr lang="en-US" dirty="0">
-                <a:solidFill>
-                  <a:srgbClr val="000000"/>
-                </a:solidFill>
-                <a:latin typeface="Courier New" panose="02070309020205020404" pitchFamily="49" charset="0"/>
-              </a:rPr>
-              <a:t> + </a:t>
-            </a:r>
-            <a:r>
-              <a:rPr lang="en-US" dirty="0" err="1">
-                <a:solidFill>
-                  <a:srgbClr val="000000"/>
-                </a:solidFill>
-                <a:latin typeface="Courier New" panose="02070309020205020404" pitchFamily="49" charset="0"/>
-              </a:rPr>
-              <a:t>LABot</a:t>
-            </a:r>
-            <a:r>
-              <a:rPr lang="en-US" dirty="0">
-                <a:solidFill>
-                  <a:srgbClr val="000000"/>
-                </a:solidFill>
-                <a:latin typeface="Courier New" panose="02070309020205020404" pitchFamily="49" charset="0"/>
-              </a:rPr>
-              <a:t> + ESLA;</a:t>
-            </a:r>
-          </a:p>
-          <a:p>
-            <a:r>
-              <a:rPr lang="en-US" dirty="0">
-                <a:solidFill>
-                  <a:srgbClr val="000000"/>
-                </a:solidFill>
-                <a:latin typeface="Courier New" panose="02070309020205020404" pitchFamily="49" charset="0"/>
-              </a:rPr>
-              <a:t>L2_phA = </a:t>
-            </a:r>
-            <a:r>
-              <a:rPr lang="en-US" dirty="0" err="1">
-                <a:solidFill>
-                  <a:srgbClr val="000000"/>
-                </a:solidFill>
-                <a:latin typeface="Courier New" panose="02070309020205020404" pitchFamily="49" charset="0"/>
-              </a:rPr>
-              <a:t>LABTop+LABBot</a:t>
-            </a:r>
-            <a:r>
-              <a:rPr lang="en-US" dirty="0">
-                <a:solidFill>
-                  <a:srgbClr val="000000"/>
-                </a:solidFill>
-                <a:latin typeface="Courier New" panose="02070309020205020404" pitchFamily="49" charset="0"/>
-              </a:rPr>
-              <a:t>;</a:t>
-            </a:r>
-          </a:p>
-          <a:p>
-            <a:r>
-              <a:rPr lang="en-US" dirty="0">
-                <a:solidFill>
-                  <a:srgbClr val="000000"/>
-                </a:solidFill>
-                <a:latin typeface="Courier New" panose="02070309020205020404" pitchFamily="49" charset="0"/>
-              </a:rPr>
-              <a:t>L3_phA= ESLB;</a:t>
-            </a:r>
-          </a:p>
-          <a:p>
-            <a:r>
-              <a:rPr lang="en-US" dirty="0">
-                <a:solidFill>
-                  <a:srgbClr val="000000"/>
-                </a:solidFill>
-                <a:latin typeface="Courier New" panose="02070309020205020404" pitchFamily="49" charset="0"/>
-              </a:rPr>
-              <a:t>L4_phA = </a:t>
-            </a:r>
-            <a:r>
-              <a:rPr lang="en-US" dirty="0" err="1">
-                <a:solidFill>
-                  <a:srgbClr val="000000"/>
-                </a:solidFill>
-                <a:latin typeface="Courier New" panose="02070309020205020404" pitchFamily="49" charset="0"/>
-              </a:rPr>
-              <a:t>LBTop+LBBot</a:t>
-            </a:r>
-            <a:r>
-              <a:rPr lang="en-US" dirty="0">
-                <a:solidFill>
-                  <a:srgbClr val="000000"/>
-                </a:solidFill>
-                <a:latin typeface="Courier New" panose="02070309020205020404" pitchFamily="49" charset="0"/>
-              </a:rPr>
-              <a:t>;</a:t>
-            </a:r>
-          </a:p>
-          <a:p>
-            <a:r>
-              <a:rPr lang="en-US" dirty="0">
-                <a:solidFill>
-                  <a:srgbClr val="000000"/>
-                </a:solidFill>
-                <a:latin typeface="Courier New" panose="02070309020205020404" pitchFamily="49" charset="0"/>
-              </a:rPr>
-              <a:t>L5_phA = Lin;</a:t>
-            </a:r>
-          </a:p>
-          <a:p>
-            <a:r>
-              <a:rPr lang="en-US" dirty="0">
-                <a:solidFill>
-                  <a:srgbClr val="000000"/>
-                </a:solidFill>
-                <a:latin typeface="Courier New" panose="02070309020205020404" pitchFamily="49" charset="0"/>
-              </a:rPr>
-              <a:t>L6_phA=</a:t>
-            </a:r>
-            <a:r>
-              <a:rPr lang="en-US" dirty="0" err="1">
-                <a:solidFill>
-                  <a:srgbClr val="000000"/>
-                </a:solidFill>
-                <a:latin typeface="Courier New" panose="02070309020205020404" pitchFamily="49" charset="0"/>
-              </a:rPr>
-              <a:t>LBCTop</a:t>
-            </a:r>
-            <a:r>
-              <a:rPr lang="en-US" dirty="0">
-                <a:solidFill>
-                  <a:srgbClr val="000000"/>
-                </a:solidFill>
-                <a:latin typeface="Courier New" panose="02070309020205020404" pitchFamily="49" charset="0"/>
-              </a:rPr>
-              <a:t> + </a:t>
-            </a:r>
-            <a:r>
-              <a:rPr lang="en-US" dirty="0" err="1">
-                <a:solidFill>
-                  <a:srgbClr val="000000"/>
-                </a:solidFill>
-                <a:latin typeface="Courier New" panose="02070309020205020404" pitchFamily="49" charset="0"/>
-              </a:rPr>
-              <a:t>LBCBot</a:t>
-            </a:r>
-            <a:r>
-              <a:rPr lang="en-US" dirty="0">
-                <a:solidFill>
-                  <a:srgbClr val="000000"/>
-                </a:solidFill>
-                <a:latin typeface="Courier New" panose="02070309020205020404" pitchFamily="49" charset="0"/>
-              </a:rPr>
-              <a:t> + ESLC;</a:t>
-            </a:r>
-          </a:p>
-          <a:p>
-            <a:r>
-              <a:rPr lang="en-US" dirty="0">
-                <a:solidFill>
-                  <a:srgbClr val="228B22"/>
-                </a:solidFill>
-                <a:latin typeface="Courier New" panose="02070309020205020404" pitchFamily="49" charset="0"/>
-              </a:rPr>
-              <a:t>%% Calculated impedances - </a:t>
-            </a:r>
-            <a:r>
-              <a:rPr lang="en-US" dirty="0" err="1">
-                <a:solidFill>
-                  <a:srgbClr val="228B22"/>
-                </a:solidFill>
-                <a:latin typeface="Courier New" panose="02070309020205020404" pitchFamily="49" charset="0"/>
-              </a:rPr>
-              <a:t>phA</a:t>
-            </a:r>
-            <a:endParaRPr lang="en-US" dirty="0">
-              <a:solidFill>
-                <a:srgbClr val="228B22"/>
-              </a:solidFill>
-              <a:latin typeface="Courier New" panose="02070309020205020404" pitchFamily="49" charset="0"/>
-            </a:endParaRPr>
-          </a:p>
-          <a:p>
-            <a:r>
-              <a:rPr lang="pl-PL" dirty="0">
-                <a:solidFill>
-                  <a:srgbClr val="000000"/>
-                </a:solidFill>
-                <a:latin typeface="Courier New" panose="02070309020205020404" pitchFamily="49" charset="0"/>
-              </a:rPr>
-              <a:t>Z1_phA = 1i*w*L6_phA + 1./(1i*w*C1C);</a:t>
-            </a:r>
-          </a:p>
-          <a:p>
-            <a:r>
-              <a:rPr lang="pl-PL" dirty="0">
-                <a:solidFill>
-                  <a:srgbClr val="000000"/>
-                </a:solidFill>
-                <a:latin typeface="Courier New" panose="02070309020205020404" pitchFamily="49" charset="0"/>
-              </a:rPr>
-              <a:t>Z2_phA = 1i*w*L5_phA + Rin;</a:t>
-            </a:r>
-          </a:p>
-          <a:p>
-            <a:r>
-              <a:rPr lang="pl-PL" dirty="0">
-                <a:solidFill>
-                  <a:srgbClr val="000000"/>
-                </a:solidFill>
-                <a:latin typeface="Courier New" panose="02070309020205020404" pitchFamily="49" charset="0"/>
-              </a:rPr>
-              <a:t>Z3_phA = Z1_phA.*Z2_phA./(Z1_phA+Z2_phA);</a:t>
-            </a:r>
-          </a:p>
-          <a:p>
-            <a:r>
-              <a:rPr lang="pl-PL" dirty="0">
-                <a:solidFill>
-                  <a:srgbClr val="000000"/>
-                </a:solidFill>
-                <a:latin typeface="Courier New" panose="02070309020205020404" pitchFamily="49" charset="0"/>
-              </a:rPr>
-              <a:t>Z4_phA = Z3_phA + 1i*w*L4_phA;</a:t>
-            </a:r>
-          </a:p>
-          <a:p>
-            <a:r>
-              <a:rPr lang="pl-PL" dirty="0">
-                <a:solidFill>
-                  <a:srgbClr val="000000"/>
-                </a:solidFill>
-                <a:latin typeface="Courier New" panose="02070309020205020404" pitchFamily="49" charset="0"/>
-              </a:rPr>
-              <a:t>Z5_phA = 1i*w*L3_phA + 1./(1i*w*C1B);</a:t>
-            </a:r>
-          </a:p>
-          <a:p>
-            <a:r>
-              <a:rPr lang="pl-PL" dirty="0">
-                <a:solidFill>
-                  <a:srgbClr val="000000"/>
-                </a:solidFill>
-                <a:latin typeface="Courier New" panose="02070309020205020404" pitchFamily="49" charset="0"/>
-              </a:rPr>
-              <a:t>Z6_phA = Z4_phA.*Z5_phA./(Z4_phA+Z5_phA);</a:t>
-            </a:r>
-          </a:p>
-          <a:p>
-            <a:r>
-              <a:rPr lang="pl-PL" dirty="0">
-                <a:solidFill>
-                  <a:srgbClr val="000000"/>
-                </a:solidFill>
-                <a:latin typeface="Courier New" panose="02070309020205020404" pitchFamily="49" charset="0"/>
-              </a:rPr>
-              <a:t>Z7_phA=Z6_phA+1i*w*L2_phA;</a:t>
-            </a:r>
-          </a:p>
-          <a:p>
-            <a:r>
-              <a:rPr lang="pl-PL" dirty="0">
-                <a:solidFill>
-                  <a:srgbClr val="000000"/>
-                </a:solidFill>
-                <a:latin typeface="Courier New" panose="02070309020205020404" pitchFamily="49" charset="0"/>
-              </a:rPr>
-              <a:t>Z8_phA=1i*w*L1_phA + 1./(1i*w*C1A);</a:t>
-            </a:r>
-          </a:p>
-          <a:p>
-            <a:r>
-              <a:rPr lang="pl-PL" dirty="0">
-                <a:solidFill>
-                  <a:srgbClr val="000000"/>
-                </a:solidFill>
-                <a:latin typeface="Courier New" panose="02070309020205020404" pitchFamily="49" charset="0"/>
-              </a:rPr>
-              <a:t>Zeqv_phA = Z7_phA.*Z8_phA./(Z7_phA+Z8_phA);</a:t>
-            </a:r>
-          </a:p>
-          <a:p>
-            <a:r>
-              <a:rPr lang="en-US" dirty="0">
-                <a:solidFill>
-                  <a:srgbClr val="228B22"/>
-                </a:solidFill>
-                <a:latin typeface="Courier New" panose="02070309020205020404" pitchFamily="49" charset="0"/>
-              </a:rPr>
-              <a:t>%% Capacitor A </a:t>
-            </a:r>
-          </a:p>
-          <a:p>
-            <a:r>
-              <a:rPr lang="pl-PL" dirty="0">
-                <a:solidFill>
-                  <a:srgbClr val="000000"/>
-                </a:solidFill>
-                <a:latin typeface="Courier New" panose="02070309020205020404" pitchFamily="49" charset="0"/>
-              </a:rPr>
-              <a:t>capA_phA= Z7_phA./(Z7_phA+Z8_phA);</a:t>
-            </a:r>
-          </a:p>
-          <a:p>
-            <a:r>
-              <a:rPr lang="en-US" dirty="0">
-                <a:solidFill>
-                  <a:srgbClr val="228B22"/>
-                </a:solidFill>
-                <a:latin typeface="Courier New" panose="02070309020205020404" pitchFamily="49" charset="0"/>
-              </a:rPr>
-              <a:t>%% New merged </a:t>
-            </a:r>
-            <a:r>
-              <a:rPr lang="en-US" dirty="0" err="1">
-                <a:solidFill>
-                  <a:srgbClr val="228B22"/>
-                </a:solidFill>
-                <a:latin typeface="Courier New" panose="02070309020205020404" pitchFamily="49" charset="0"/>
-              </a:rPr>
-              <a:t>inducances</a:t>
-            </a:r>
-            <a:r>
-              <a:rPr lang="en-US" dirty="0">
-                <a:solidFill>
-                  <a:srgbClr val="228B22"/>
-                </a:solidFill>
-                <a:latin typeface="Courier New" panose="02070309020205020404" pitchFamily="49" charset="0"/>
-              </a:rPr>
-              <a:t> - </a:t>
-            </a:r>
-            <a:r>
-              <a:rPr lang="en-US" dirty="0" err="1">
-                <a:solidFill>
-                  <a:srgbClr val="228B22"/>
-                </a:solidFill>
-                <a:latin typeface="Courier New" panose="02070309020205020404" pitchFamily="49" charset="0"/>
-              </a:rPr>
-              <a:t>phB</a:t>
-            </a:r>
-            <a:endParaRPr lang="en-US" dirty="0">
-              <a:solidFill>
-                <a:srgbClr val="228B22"/>
-              </a:solidFill>
-              <a:latin typeface="Courier New" panose="02070309020205020404" pitchFamily="49" charset="0"/>
-            </a:endParaRPr>
-          </a:p>
-          <a:p>
-            <a:r>
-              <a:rPr lang="en-US" dirty="0">
-                <a:solidFill>
-                  <a:srgbClr val="000000"/>
-                </a:solidFill>
-                <a:latin typeface="Courier New" panose="02070309020205020404" pitchFamily="49" charset="0"/>
-              </a:rPr>
-              <a:t>L1_phB = </a:t>
-            </a:r>
-            <a:r>
-              <a:rPr lang="en-US" dirty="0" err="1">
-                <a:solidFill>
-                  <a:srgbClr val="000000"/>
-                </a:solidFill>
-                <a:latin typeface="Courier New" panose="02070309020205020404" pitchFamily="49" charset="0"/>
-              </a:rPr>
-              <a:t>LATop</a:t>
-            </a:r>
-            <a:r>
-              <a:rPr lang="en-US" dirty="0">
-                <a:solidFill>
-                  <a:srgbClr val="000000"/>
-                </a:solidFill>
-                <a:latin typeface="Courier New" panose="02070309020205020404" pitchFamily="49" charset="0"/>
-              </a:rPr>
-              <a:t> + </a:t>
-            </a:r>
-            <a:r>
-              <a:rPr lang="en-US" dirty="0" err="1">
-                <a:solidFill>
-                  <a:srgbClr val="000000"/>
-                </a:solidFill>
-                <a:latin typeface="Courier New" panose="02070309020205020404" pitchFamily="49" charset="0"/>
-              </a:rPr>
-              <a:t>LABot</a:t>
-            </a:r>
-            <a:r>
-              <a:rPr lang="en-US" dirty="0">
-                <a:solidFill>
-                  <a:srgbClr val="000000"/>
-                </a:solidFill>
-                <a:latin typeface="Courier New" panose="02070309020205020404" pitchFamily="49" charset="0"/>
-              </a:rPr>
-              <a:t> + </a:t>
-            </a:r>
-            <a:r>
-              <a:rPr lang="en-US" dirty="0" err="1">
-                <a:solidFill>
-                  <a:srgbClr val="000000"/>
-                </a:solidFill>
-                <a:latin typeface="Courier New" panose="02070309020205020404" pitchFamily="49" charset="0"/>
-              </a:rPr>
-              <a:t>LABTop</a:t>
-            </a:r>
-            <a:r>
-              <a:rPr lang="en-US" dirty="0">
-                <a:solidFill>
-                  <a:srgbClr val="000000"/>
-                </a:solidFill>
-                <a:latin typeface="Courier New" panose="02070309020205020404" pitchFamily="49" charset="0"/>
-              </a:rPr>
-              <a:t> + </a:t>
-            </a:r>
-            <a:r>
-              <a:rPr lang="en-US" dirty="0" err="1">
-                <a:solidFill>
-                  <a:srgbClr val="000000"/>
-                </a:solidFill>
-                <a:latin typeface="Courier New" panose="02070309020205020404" pitchFamily="49" charset="0"/>
-              </a:rPr>
-              <a:t>LABBot</a:t>
-            </a:r>
-            <a:r>
-              <a:rPr lang="en-US" dirty="0">
-                <a:solidFill>
-                  <a:srgbClr val="000000"/>
-                </a:solidFill>
-                <a:latin typeface="Courier New" panose="02070309020205020404" pitchFamily="49" charset="0"/>
-              </a:rPr>
-              <a:t> + ESLA;</a:t>
-            </a:r>
-          </a:p>
-          <a:p>
-            <a:r>
-              <a:rPr lang="en-US" dirty="0">
-                <a:solidFill>
-                  <a:srgbClr val="000000"/>
-                </a:solidFill>
-                <a:latin typeface="Courier New" panose="02070309020205020404" pitchFamily="49" charset="0"/>
-              </a:rPr>
-              <a:t>L2_phB = ESLB;</a:t>
-            </a:r>
-          </a:p>
-          <a:p>
-            <a:r>
-              <a:rPr lang="en-US" dirty="0">
-                <a:solidFill>
-                  <a:srgbClr val="000000"/>
-                </a:solidFill>
-                <a:latin typeface="Courier New" panose="02070309020205020404" pitchFamily="49" charset="0"/>
-              </a:rPr>
-              <a:t>L3_phB = </a:t>
-            </a:r>
-            <a:r>
-              <a:rPr lang="en-US" dirty="0" err="1">
-                <a:solidFill>
-                  <a:srgbClr val="000000"/>
-                </a:solidFill>
-                <a:latin typeface="Courier New" panose="02070309020205020404" pitchFamily="49" charset="0"/>
-              </a:rPr>
-              <a:t>LBTop</a:t>
-            </a:r>
-            <a:r>
-              <a:rPr lang="en-US" dirty="0">
-                <a:solidFill>
-                  <a:srgbClr val="000000"/>
-                </a:solidFill>
-                <a:latin typeface="Courier New" panose="02070309020205020404" pitchFamily="49" charset="0"/>
-              </a:rPr>
-              <a:t> + </a:t>
-            </a:r>
-            <a:r>
-              <a:rPr lang="en-US" dirty="0" err="1">
-                <a:solidFill>
-                  <a:srgbClr val="000000"/>
-                </a:solidFill>
-                <a:latin typeface="Courier New" panose="02070309020205020404" pitchFamily="49" charset="0"/>
-              </a:rPr>
-              <a:t>LBBot</a:t>
-            </a:r>
-            <a:r>
-              <a:rPr lang="en-US" dirty="0">
-                <a:solidFill>
-                  <a:srgbClr val="000000"/>
-                </a:solidFill>
-                <a:latin typeface="Courier New" panose="02070309020205020404" pitchFamily="49" charset="0"/>
-              </a:rPr>
-              <a:t>;</a:t>
-            </a:r>
-          </a:p>
-          <a:p>
-            <a:r>
-              <a:rPr lang="en-US" dirty="0">
-                <a:solidFill>
-                  <a:srgbClr val="000000"/>
-                </a:solidFill>
-                <a:latin typeface="Courier New" panose="02070309020205020404" pitchFamily="49" charset="0"/>
-              </a:rPr>
-              <a:t>L4_phB = </a:t>
-            </a:r>
-            <a:r>
-              <a:rPr lang="en-US" dirty="0" err="1">
-                <a:solidFill>
-                  <a:srgbClr val="000000"/>
-                </a:solidFill>
-                <a:latin typeface="Courier New" panose="02070309020205020404" pitchFamily="49" charset="0"/>
-              </a:rPr>
-              <a:t>LBCTop</a:t>
-            </a:r>
-            <a:r>
-              <a:rPr lang="en-US" dirty="0">
-                <a:solidFill>
-                  <a:srgbClr val="000000"/>
-                </a:solidFill>
-                <a:latin typeface="Courier New" panose="02070309020205020404" pitchFamily="49" charset="0"/>
-              </a:rPr>
-              <a:t> + </a:t>
-            </a:r>
-            <a:r>
-              <a:rPr lang="en-US" dirty="0" err="1">
-                <a:solidFill>
-                  <a:srgbClr val="000000"/>
-                </a:solidFill>
-                <a:latin typeface="Courier New" panose="02070309020205020404" pitchFamily="49" charset="0"/>
-              </a:rPr>
-              <a:t>LBCBot</a:t>
-            </a:r>
-            <a:r>
-              <a:rPr lang="en-US" dirty="0">
-                <a:solidFill>
-                  <a:srgbClr val="000000"/>
-                </a:solidFill>
-                <a:latin typeface="Courier New" panose="02070309020205020404" pitchFamily="49" charset="0"/>
-              </a:rPr>
-              <a:t> + ESLC;</a:t>
-            </a:r>
-          </a:p>
-          <a:p>
-            <a:r>
-              <a:rPr lang="en-US" dirty="0">
-                <a:solidFill>
-                  <a:srgbClr val="228B22"/>
-                </a:solidFill>
-                <a:latin typeface="Courier New" panose="02070309020205020404" pitchFamily="49" charset="0"/>
-              </a:rPr>
-              <a:t>%% Calculated impedances - </a:t>
-            </a:r>
-            <a:r>
-              <a:rPr lang="en-US" dirty="0" err="1">
-                <a:solidFill>
-                  <a:srgbClr val="228B22"/>
-                </a:solidFill>
-                <a:latin typeface="Courier New" panose="02070309020205020404" pitchFamily="49" charset="0"/>
-              </a:rPr>
-              <a:t>phB</a:t>
-            </a:r>
-            <a:endParaRPr lang="en-US" dirty="0">
-              <a:solidFill>
-                <a:srgbClr val="228B22"/>
-              </a:solidFill>
-              <a:latin typeface="Courier New" panose="02070309020205020404" pitchFamily="49" charset="0"/>
-            </a:endParaRPr>
-          </a:p>
-          <a:p>
-            <a:r>
-              <a:rPr lang="pl-PL" dirty="0">
-                <a:solidFill>
-                  <a:srgbClr val="000000"/>
-                </a:solidFill>
-                <a:latin typeface="Courier New" panose="02070309020205020404" pitchFamily="49" charset="0"/>
-              </a:rPr>
-              <a:t>Z1_phB = 1i*w*L1_phB + 1./(1i*w*C1A);</a:t>
-            </a:r>
-          </a:p>
-          <a:p>
-            <a:r>
-              <a:rPr lang="pl-PL" dirty="0">
-                <a:solidFill>
-                  <a:srgbClr val="000000"/>
-                </a:solidFill>
-                <a:latin typeface="Courier New" panose="02070309020205020404" pitchFamily="49" charset="0"/>
-              </a:rPr>
-              <a:t>Z2_phB = 1i*w*L2_phB + 1./(1i*w*C1B);</a:t>
-            </a:r>
-          </a:p>
-          <a:p>
-            <a:r>
-              <a:rPr lang="pl-PL" dirty="0">
-                <a:solidFill>
-                  <a:srgbClr val="000000"/>
-                </a:solidFill>
-                <a:latin typeface="Courier New" panose="02070309020205020404" pitchFamily="49" charset="0"/>
-              </a:rPr>
-              <a:t>Z3_phB = Z1_phB.*Z2_phB./(Z1_phB+Z2_phB);</a:t>
-            </a:r>
-          </a:p>
-          <a:p>
-            <a:r>
-              <a:rPr lang="pl-PL" dirty="0">
-                <a:solidFill>
-                  <a:srgbClr val="000000"/>
-                </a:solidFill>
-                <a:latin typeface="Courier New" panose="02070309020205020404" pitchFamily="49" charset="0"/>
-              </a:rPr>
-              <a:t>Z4_phB = Z3_phB + 1i*w*(L3_phB);</a:t>
-            </a:r>
-          </a:p>
-          <a:p>
-            <a:r>
-              <a:rPr lang="pl-PL" dirty="0">
-                <a:solidFill>
-                  <a:srgbClr val="000000"/>
-                </a:solidFill>
-                <a:latin typeface="Courier New" panose="02070309020205020404" pitchFamily="49" charset="0"/>
-              </a:rPr>
-              <a:t>Z6_phB= 1i*w*Lin + Rin;</a:t>
-            </a:r>
-          </a:p>
-          <a:p>
-            <a:r>
-              <a:rPr lang="pl-PL" dirty="0">
-                <a:solidFill>
-                  <a:srgbClr val="000000"/>
-                </a:solidFill>
-                <a:latin typeface="Courier New" panose="02070309020205020404" pitchFamily="49" charset="0"/>
-              </a:rPr>
-              <a:t>Z7=Z4_phB.*Z6_phB./(Z4_phB+Z6_phB);</a:t>
-            </a:r>
-          </a:p>
-          <a:p>
-            <a:r>
-              <a:rPr lang="pl-PL" dirty="0">
-                <a:solidFill>
-                  <a:srgbClr val="000000"/>
-                </a:solidFill>
-                <a:latin typeface="Courier New" panose="02070309020205020404" pitchFamily="49" charset="0"/>
-              </a:rPr>
-              <a:t>Z5_phB = 1i*w*L4_phB + 1./(1i*w*C1C);</a:t>
-            </a:r>
-          </a:p>
-          <a:p>
-            <a:r>
-              <a:rPr lang="pl-PL" dirty="0">
-                <a:solidFill>
-                  <a:srgbClr val="000000"/>
-                </a:solidFill>
-                <a:latin typeface="Courier New" panose="02070309020205020404" pitchFamily="49" charset="0"/>
-              </a:rPr>
-              <a:t>Zeqv_phB = Z4_phB.*Z5_phB./(Z4_phB+Z5_phB);</a:t>
-            </a:r>
-          </a:p>
-          <a:p>
-            <a:r>
-              <a:rPr lang="en-US" dirty="0">
-                <a:solidFill>
-                  <a:srgbClr val="228B22"/>
-                </a:solidFill>
-                <a:latin typeface="Courier New" panose="02070309020205020404" pitchFamily="49" charset="0"/>
-              </a:rPr>
-              <a:t>%% capacitor A</a:t>
-            </a:r>
-          </a:p>
-          <a:p>
-            <a:r>
-              <a:rPr lang="pl-PL" dirty="0">
-                <a:solidFill>
-                  <a:srgbClr val="000000"/>
-                </a:solidFill>
-                <a:latin typeface="Courier New" panose="02070309020205020404" pitchFamily="49" charset="0"/>
-              </a:rPr>
-              <a:t>capA_phB=(Z5_phB./(Z7_phB+Z5_phB)).*(Z6_phB./(Z4_phB+Z6_phB)).*(Z2_phB./(Z1_phB+Z2_phB));</a:t>
-            </a:r>
-          </a:p>
-          <a:p>
-            <a:r>
-              <a:rPr lang="en-US" dirty="0">
-                <a:solidFill>
-                  <a:srgbClr val="228B22"/>
-                </a:solidFill>
-                <a:latin typeface="Courier New" panose="02070309020205020404" pitchFamily="49" charset="0"/>
-              </a:rPr>
-              <a:t>%% New merged </a:t>
-            </a:r>
-            <a:r>
-              <a:rPr lang="en-US" dirty="0" err="1">
-                <a:solidFill>
-                  <a:srgbClr val="228B22"/>
-                </a:solidFill>
-                <a:latin typeface="Courier New" panose="02070309020205020404" pitchFamily="49" charset="0"/>
-              </a:rPr>
-              <a:t>inducances</a:t>
-            </a:r>
-            <a:r>
-              <a:rPr lang="en-US" dirty="0">
-                <a:solidFill>
-                  <a:srgbClr val="228B22"/>
-                </a:solidFill>
-                <a:latin typeface="Courier New" panose="02070309020205020404" pitchFamily="49" charset="0"/>
-              </a:rPr>
-              <a:t> - </a:t>
-            </a:r>
-            <a:r>
-              <a:rPr lang="en-US" dirty="0" err="1">
-                <a:solidFill>
-                  <a:srgbClr val="228B22"/>
-                </a:solidFill>
-                <a:latin typeface="Courier New" panose="02070309020205020404" pitchFamily="49" charset="0"/>
-              </a:rPr>
-              <a:t>phC</a:t>
-            </a:r>
-            <a:endParaRPr lang="en-US" dirty="0">
-              <a:solidFill>
-                <a:srgbClr val="228B22"/>
-              </a:solidFill>
-              <a:latin typeface="Courier New" panose="02070309020205020404" pitchFamily="49" charset="0"/>
-            </a:endParaRPr>
-          </a:p>
-          <a:p>
-            <a:r>
-              <a:rPr lang="en-US" dirty="0">
-                <a:solidFill>
-                  <a:srgbClr val="000000"/>
-                </a:solidFill>
-                <a:latin typeface="Courier New" panose="02070309020205020404" pitchFamily="49" charset="0"/>
-              </a:rPr>
-              <a:t>L1_phC = </a:t>
-            </a:r>
-            <a:r>
-              <a:rPr lang="en-US" dirty="0" err="1">
-                <a:solidFill>
-                  <a:srgbClr val="000000"/>
-                </a:solidFill>
-                <a:latin typeface="Courier New" panose="02070309020205020404" pitchFamily="49" charset="0"/>
-              </a:rPr>
-              <a:t>LATop</a:t>
-            </a:r>
-            <a:r>
-              <a:rPr lang="en-US" dirty="0">
-                <a:solidFill>
-                  <a:srgbClr val="000000"/>
-                </a:solidFill>
-                <a:latin typeface="Courier New" panose="02070309020205020404" pitchFamily="49" charset="0"/>
-              </a:rPr>
-              <a:t> + </a:t>
-            </a:r>
-            <a:r>
-              <a:rPr lang="en-US" dirty="0" err="1">
-                <a:solidFill>
-                  <a:srgbClr val="000000"/>
-                </a:solidFill>
-                <a:latin typeface="Courier New" panose="02070309020205020404" pitchFamily="49" charset="0"/>
-              </a:rPr>
-              <a:t>LABot</a:t>
-            </a:r>
-            <a:r>
-              <a:rPr lang="en-US" dirty="0">
-                <a:solidFill>
-                  <a:srgbClr val="000000"/>
-                </a:solidFill>
-                <a:latin typeface="Courier New" panose="02070309020205020404" pitchFamily="49" charset="0"/>
-              </a:rPr>
-              <a:t> + </a:t>
-            </a:r>
-            <a:r>
-              <a:rPr lang="en-US" dirty="0" err="1">
-                <a:solidFill>
-                  <a:srgbClr val="000000"/>
-                </a:solidFill>
-                <a:latin typeface="Courier New" panose="02070309020205020404" pitchFamily="49" charset="0"/>
-              </a:rPr>
-              <a:t>LABTop</a:t>
-            </a:r>
-            <a:r>
-              <a:rPr lang="en-US" dirty="0">
-                <a:solidFill>
-                  <a:srgbClr val="000000"/>
-                </a:solidFill>
-                <a:latin typeface="Courier New" panose="02070309020205020404" pitchFamily="49" charset="0"/>
-              </a:rPr>
-              <a:t> + </a:t>
-            </a:r>
-            <a:r>
-              <a:rPr lang="en-US" dirty="0" err="1">
-                <a:solidFill>
-                  <a:srgbClr val="000000"/>
-                </a:solidFill>
-                <a:latin typeface="Courier New" panose="02070309020205020404" pitchFamily="49" charset="0"/>
-              </a:rPr>
-              <a:t>LABBot</a:t>
-            </a:r>
-            <a:r>
-              <a:rPr lang="en-US" dirty="0">
-                <a:solidFill>
-                  <a:srgbClr val="000000"/>
-                </a:solidFill>
-                <a:latin typeface="Courier New" panose="02070309020205020404" pitchFamily="49" charset="0"/>
-              </a:rPr>
-              <a:t> + ESLA;</a:t>
-            </a:r>
-          </a:p>
-          <a:p>
-            <a:r>
-              <a:rPr lang="en-US" dirty="0">
-                <a:solidFill>
-                  <a:srgbClr val="000000"/>
-                </a:solidFill>
-                <a:latin typeface="Courier New" panose="02070309020205020404" pitchFamily="49" charset="0"/>
-              </a:rPr>
-              <a:t>L2_phC = ESLB;</a:t>
-            </a:r>
-          </a:p>
-          <a:p>
-            <a:r>
-              <a:rPr lang="en-US" dirty="0">
-                <a:solidFill>
-                  <a:srgbClr val="000000"/>
-                </a:solidFill>
-                <a:latin typeface="Courier New" panose="02070309020205020404" pitchFamily="49" charset="0"/>
-              </a:rPr>
-              <a:t>L3_phC = </a:t>
-            </a:r>
-            <a:r>
-              <a:rPr lang="en-US" dirty="0" err="1">
-                <a:solidFill>
-                  <a:srgbClr val="000000"/>
-                </a:solidFill>
-                <a:latin typeface="Courier New" panose="02070309020205020404" pitchFamily="49" charset="0"/>
-              </a:rPr>
-              <a:t>LBTop</a:t>
-            </a:r>
-            <a:r>
-              <a:rPr lang="en-US" dirty="0">
-                <a:solidFill>
-                  <a:srgbClr val="000000"/>
-                </a:solidFill>
-                <a:latin typeface="Courier New" panose="02070309020205020404" pitchFamily="49" charset="0"/>
-              </a:rPr>
-              <a:t> + </a:t>
-            </a:r>
-            <a:r>
-              <a:rPr lang="en-US" dirty="0" err="1">
-                <a:solidFill>
-                  <a:srgbClr val="000000"/>
-                </a:solidFill>
-                <a:latin typeface="Courier New" panose="02070309020205020404" pitchFamily="49" charset="0"/>
-              </a:rPr>
-              <a:t>LBBot</a:t>
-            </a:r>
-            <a:r>
-              <a:rPr lang="en-US" dirty="0">
-                <a:solidFill>
-                  <a:srgbClr val="000000"/>
-                </a:solidFill>
-                <a:latin typeface="Courier New" panose="02070309020205020404" pitchFamily="49" charset="0"/>
-              </a:rPr>
-              <a:t> ;</a:t>
-            </a:r>
-          </a:p>
-          <a:p>
-            <a:r>
-              <a:rPr lang="en-US" dirty="0">
-                <a:solidFill>
-                  <a:srgbClr val="000000"/>
-                </a:solidFill>
-                <a:latin typeface="Courier New" panose="02070309020205020404" pitchFamily="49" charset="0"/>
-              </a:rPr>
-              <a:t>L6_phC=</a:t>
-            </a:r>
-            <a:r>
-              <a:rPr lang="en-US" dirty="0" err="1">
-                <a:solidFill>
-                  <a:srgbClr val="000000"/>
-                </a:solidFill>
-                <a:latin typeface="Courier New" panose="02070309020205020404" pitchFamily="49" charset="0"/>
-              </a:rPr>
-              <a:t>LBCTop</a:t>
-            </a:r>
-            <a:r>
-              <a:rPr lang="en-US" dirty="0">
-                <a:solidFill>
-                  <a:srgbClr val="000000"/>
-                </a:solidFill>
-                <a:latin typeface="Courier New" panose="02070309020205020404" pitchFamily="49" charset="0"/>
-              </a:rPr>
-              <a:t> + </a:t>
-            </a:r>
-            <a:r>
-              <a:rPr lang="en-US" dirty="0" err="1">
-                <a:solidFill>
-                  <a:srgbClr val="000000"/>
-                </a:solidFill>
-                <a:latin typeface="Courier New" panose="02070309020205020404" pitchFamily="49" charset="0"/>
-              </a:rPr>
-              <a:t>LBCBot</a:t>
-            </a:r>
-            <a:r>
-              <a:rPr lang="en-US" dirty="0">
-                <a:solidFill>
-                  <a:srgbClr val="000000"/>
-                </a:solidFill>
-                <a:latin typeface="Courier New" panose="02070309020205020404" pitchFamily="49" charset="0"/>
-              </a:rPr>
-              <a:t>;</a:t>
-            </a:r>
-          </a:p>
-          <a:p>
-            <a:r>
-              <a:rPr lang="en-US" dirty="0">
-                <a:solidFill>
-                  <a:srgbClr val="000000"/>
-                </a:solidFill>
-                <a:latin typeface="Courier New" panose="02070309020205020404" pitchFamily="49" charset="0"/>
-              </a:rPr>
-              <a:t>L4_phC = ESLC;</a:t>
-            </a:r>
-          </a:p>
-          <a:p>
-            <a:r>
-              <a:rPr lang="en-US" dirty="0">
-                <a:solidFill>
-                  <a:srgbClr val="000000"/>
-                </a:solidFill>
-                <a:latin typeface="Courier New" panose="02070309020205020404" pitchFamily="49" charset="0"/>
-              </a:rPr>
-              <a:t>L5_phC = </a:t>
-            </a:r>
-            <a:r>
-              <a:rPr lang="en-US" dirty="0" err="1">
-                <a:solidFill>
-                  <a:srgbClr val="000000"/>
-                </a:solidFill>
-                <a:latin typeface="Courier New" panose="02070309020205020404" pitchFamily="49" charset="0"/>
-              </a:rPr>
-              <a:t>LCTop</a:t>
-            </a:r>
-            <a:r>
-              <a:rPr lang="en-US" dirty="0">
-                <a:solidFill>
-                  <a:srgbClr val="000000"/>
-                </a:solidFill>
-                <a:latin typeface="Courier New" panose="02070309020205020404" pitchFamily="49" charset="0"/>
-              </a:rPr>
-              <a:t> + </a:t>
-            </a:r>
-            <a:r>
-              <a:rPr lang="en-US" dirty="0" err="1">
-                <a:solidFill>
-                  <a:srgbClr val="000000"/>
-                </a:solidFill>
-                <a:latin typeface="Courier New" panose="02070309020205020404" pitchFamily="49" charset="0"/>
-              </a:rPr>
-              <a:t>LCBot</a:t>
-            </a:r>
-            <a:r>
-              <a:rPr lang="en-US" dirty="0">
-                <a:solidFill>
-                  <a:srgbClr val="000000"/>
-                </a:solidFill>
-                <a:latin typeface="Courier New" panose="02070309020205020404" pitchFamily="49" charset="0"/>
-              </a:rPr>
-              <a:t>;</a:t>
-            </a:r>
-          </a:p>
-          <a:p>
-            <a:r>
-              <a:rPr lang="en-US" dirty="0">
-                <a:solidFill>
-                  <a:srgbClr val="228B22"/>
-                </a:solidFill>
-                <a:latin typeface="Courier New" panose="02070309020205020404" pitchFamily="49" charset="0"/>
-              </a:rPr>
-              <a:t>%% Calculated impedances - </a:t>
-            </a:r>
-            <a:r>
-              <a:rPr lang="en-US" dirty="0" err="1">
-                <a:solidFill>
-                  <a:srgbClr val="228B22"/>
-                </a:solidFill>
-                <a:latin typeface="Courier New" panose="02070309020205020404" pitchFamily="49" charset="0"/>
-              </a:rPr>
-              <a:t>phC</a:t>
-            </a:r>
-            <a:endParaRPr lang="en-US" dirty="0">
-              <a:solidFill>
-                <a:srgbClr val="228B22"/>
-              </a:solidFill>
-              <a:latin typeface="Courier New" panose="02070309020205020404" pitchFamily="49" charset="0"/>
-            </a:endParaRPr>
-          </a:p>
-          <a:p>
-            <a:r>
-              <a:rPr lang="pl-PL" dirty="0">
-                <a:solidFill>
-                  <a:srgbClr val="000000"/>
-                </a:solidFill>
-                <a:latin typeface="Courier New" panose="02070309020205020404" pitchFamily="49" charset="0"/>
-              </a:rPr>
-              <a:t>Z1_phC = 1i*w*L1_phC + 1./(1i*w*C1A);</a:t>
-            </a:r>
-          </a:p>
-          <a:p>
-            <a:r>
-              <a:rPr lang="pl-PL" dirty="0">
-                <a:solidFill>
-                  <a:srgbClr val="000000"/>
-                </a:solidFill>
-                <a:latin typeface="Courier New" panose="02070309020205020404" pitchFamily="49" charset="0"/>
-              </a:rPr>
-              <a:t>Z2_phC = 1i*w*L2_phC + 1./(1i*w*C1B);</a:t>
-            </a:r>
-          </a:p>
-          <a:p>
-            <a:r>
-              <a:rPr lang="pl-PL" dirty="0">
-                <a:solidFill>
-                  <a:srgbClr val="000000"/>
-                </a:solidFill>
-                <a:latin typeface="Courier New" panose="02070309020205020404" pitchFamily="49" charset="0"/>
-              </a:rPr>
-              <a:t>Z3_phC = Z1_phC.*Z2_phC./(Z1_phC+Z2_phC);</a:t>
-            </a:r>
-          </a:p>
-          <a:p>
-            <a:r>
-              <a:rPr lang="pl-PL" dirty="0">
-                <a:solidFill>
-                  <a:srgbClr val="000000"/>
-                </a:solidFill>
-                <a:latin typeface="Courier New" panose="02070309020205020404" pitchFamily="49" charset="0"/>
-              </a:rPr>
-              <a:t>Z4_phC = Z3_phC + 1i*w*(L3_phC);</a:t>
-            </a:r>
-          </a:p>
-          <a:p>
-            <a:r>
-              <a:rPr lang="pl-PL" dirty="0">
-                <a:solidFill>
-                  <a:srgbClr val="000000"/>
-                </a:solidFill>
-                <a:latin typeface="Courier New" panose="02070309020205020404" pitchFamily="49" charset="0"/>
-              </a:rPr>
-              <a:t>Z5_pHC= 1i*w*Lin+Rin;</a:t>
-            </a:r>
-          </a:p>
-          <a:p>
-            <a:r>
-              <a:rPr lang="pl-PL" dirty="0">
-                <a:solidFill>
-                  <a:srgbClr val="000000"/>
-                </a:solidFill>
-                <a:latin typeface="Courier New" panose="02070309020205020404" pitchFamily="49" charset="0"/>
-              </a:rPr>
-              <a:t>Z6_pHC=Z4_phC.*Z5_phC./(Z4_phC+Z5_phC);</a:t>
-            </a:r>
-          </a:p>
-          <a:p>
-            <a:r>
-              <a:rPr lang="pl-PL" dirty="0">
-                <a:solidFill>
-                  <a:srgbClr val="000000"/>
-                </a:solidFill>
-                <a:latin typeface="Courier New" panose="02070309020205020404" pitchFamily="49" charset="0"/>
-              </a:rPr>
-              <a:t>Z7_phC =Z6_pHC+L6_phC;</a:t>
-            </a:r>
-          </a:p>
-          <a:p>
-            <a:r>
-              <a:rPr lang="pl-PL" dirty="0">
-                <a:solidFill>
-                  <a:srgbClr val="000000"/>
-                </a:solidFill>
-                <a:latin typeface="Courier New" panose="02070309020205020404" pitchFamily="49" charset="0"/>
-              </a:rPr>
-              <a:t>Z8_phC = 1i*w*L4_phC + 1./(1i*w*C1C);</a:t>
-            </a:r>
-          </a:p>
-          <a:p>
-            <a:r>
-              <a:rPr lang="pl-PL" dirty="0">
-                <a:solidFill>
-                  <a:srgbClr val="000000"/>
-                </a:solidFill>
-                <a:latin typeface="Courier New" panose="02070309020205020404" pitchFamily="49" charset="0"/>
-              </a:rPr>
-              <a:t>Z9_phC = Z7_phC.*Z8_phC./(Z7_phC+Z8_phC);</a:t>
-            </a:r>
-          </a:p>
-          <a:p>
-            <a:r>
-              <a:rPr lang="pl-PL" dirty="0">
-                <a:solidFill>
-                  <a:srgbClr val="000000"/>
-                </a:solidFill>
-                <a:latin typeface="Courier New" panose="02070309020205020404" pitchFamily="49" charset="0"/>
-              </a:rPr>
-              <a:t>Zeqv_phC = Z6_phC + 1i*w*L5_phC;</a:t>
-            </a:r>
-          </a:p>
-          <a:p>
-            <a:r>
-              <a:rPr lang="en-US" dirty="0">
-                <a:solidFill>
-                  <a:srgbClr val="228B22"/>
-                </a:solidFill>
-                <a:latin typeface="Courier New" panose="02070309020205020404" pitchFamily="49" charset="0"/>
-              </a:rPr>
-              <a:t>%% capacitor A</a:t>
-            </a:r>
-          </a:p>
-          <a:p>
-            <a:r>
-              <a:rPr lang="pl-PL" dirty="0">
-                <a:solidFill>
-                  <a:srgbClr val="000000"/>
-                </a:solidFill>
-                <a:latin typeface="Courier New" panose="02070309020205020404" pitchFamily="49" charset="0"/>
-              </a:rPr>
-              <a:t>capA_phC=(Z8_phC./(Z7_phC+Z8_phC)).*(Z5_phC./(Z4_phC+Z5_phC)).*(Z2_phC./(Z1_phC+Z2_phC));</a:t>
-            </a:r>
-          </a:p>
-        </p:txBody>
-      </p:sp>
+      </p:pic>
     </p:spTree>
     <p:extLst>
       <p:ext uri="{BB962C8B-B14F-4D97-AF65-F5344CB8AC3E}">
@@ -6213,7 +5269,7 @@
           <p:cNvPr id="2" name="Picture 1">
             <a:extLst>
               <a:ext uri="{FF2B5EF4-FFF2-40B4-BE49-F238E27FC236}">
-                <a16:creationId xmlns:a16="http://schemas.microsoft.com/office/drawing/2014/main" id="{E59A986D-EC07-4336-A07B-0EC5256D660B}"/>
+                <a16:creationId xmlns:a16="http://schemas.microsoft.com/office/drawing/2014/main" id="{88DAF9B3-1681-42CE-8AB8-DC2A5CBE9668}"/>
               </a:ext>
             </a:extLst>
           </p:cNvPr>
@@ -6230,8 +5286,8 @@
         </p:blipFill>
         <p:spPr>
           <a:xfrm>
-            <a:off x="3057525" y="2671762"/>
-            <a:ext cx="6076950" cy="1514475"/>
+            <a:off x="502276" y="540913"/>
+            <a:ext cx="10775515" cy="5656913"/>
           </a:xfrm>
           <a:prstGeom prst="rect">
             <a:avLst/>
@@ -6241,7 +5297,7 @@
     </p:spTree>
     <p:extLst>
       <p:ext uri="{BB962C8B-B14F-4D97-AF65-F5344CB8AC3E}">
-        <p14:creationId xmlns:p14="http://schemas.microsoft.com/office/powerpoint/2010/main" val="1209234553"/>
+        <p14:creationId xmlns:p14="http://schemas.microsoft.com/office/powerpoint/2010/main" val="3188471770"/>
       </p:ext>
     </p:extLst>
   </p:cSld>
@@ -6268,10 +5324,80 @@
           <a:chExt cx="0" cy="0"/>
         </a:xfrm>
       </p:grpSpPr>
+      <p:pic>
+        <p:nvPicPr>
+          <p:cNvPr id="2" name="Picture 1">
+            <a:extLst>
+              <a:ext uri="{FF2B5EF4-FFF2-40B4-BE49-F238E27FC236}">
+                <a16:creationId xmlns:a16="http://schemas.microsoft.com/office/drawing/2014/main" id="{64341F31-EC3C-4DC9-A212-FBB10A243218}"/>
+              </a:ext>
+            </a:extLst>
+          </p:cNvPr>
+          <p:cNvPicPr>
+            <a:picLocks noChangeAspect="1"/>
+          </p:cNvPicPr>
+          <p:nvPr/>
+        </p:nvPicPr>
+        <p:blipFill>
+          <a:blip r:embed="rId2"/>
+          <a:stretch>
+            <a:fillRect/>
+          </a:stretch>
+        </p:blipFill>
+        <p:spPr>
+          <a:xfrm>
+            <a:off x="321971" y="592428"/>
+            <a:ext cx="11077689" cy="5878054"/>
+          </a:xfrm>
+          <a:prstGeom prst="rect">
+            <a:avLst/>
+          </a:prstGeom>
+        </p:spPr>
+      </p:pic>
+      <p:sp>
+        <p:nvSpPr>
+          <p:cNvPr id="3" name="Title 1">
+            <a:extLst>
+              <a:ext uri="{FF2B5EF4-FFF2-40B4-BE49-F238E27FC236}">
+                <a16:creationId xmlns:a16="http://schemas.microsoft.com/office/drawing/2014/main" id="{D4260F55-53FE-47F4-B1D5-3CE67DC02E6E}"/>
+              </a:ext>
+            </a:extLst>
+          </p:cNvPr>
+          <p:cNvSpPr>
+            <a:spLocks noGrp="1"/>
+          </p:cNvSpPr>
+          <p:nvPr>
+            <p:ph type="title"/>
+          </p:nvPr>
+        </p:nvSpPr>
+        <p:spPr>
+          <a:xfrm>
+            <a:off x="3670477" y="28641"/>
+            <a:ext cx="10065913" cy="563787"/>
+          </a:xfrm>
+        </p:spPr>
+        <p:txBody>
+          <a:bodyPr>
+            <a:normAutofit fontScale="90000"/>
+          </a:bodyPr>
+          <a:lstStyle/>
+          <a:p>
+            <a:r>
+              <a:rPr lang="tr-TR" dirty="0" err="1"/>
+              <a:t>Rin</a:t>
+            </a:r>
+            <a:r>
+              <a:rPr lang="tr-TR" dirty="0"/>
+              <a:t>=0.1</a:t>
+            </a:r>
+            <a:endParaRPr lang="en-US" dirty="0"/>
+          </a:p>
+        </p:txBody>
+      </p:sp>
     </p:spTree>
     <p:extLst>
       <p:ext uri="{BB962C8B-B14F-4D97-AF65-F5344CB8AC3E}">
-        <p14:creationId xmlns:p14="http://schemas.microsoft.com/office/powerpoint/2010/main" val="3188471770"/>
+        <p14:creationId xmlns:p14="http://schemas.microsoft.com/office/powerpoint/2010/main" val="2333719302"/>
       </p:ext>
     </p:extLst>
   </p:cSld>
@@ -6298,10 +5424,80 @@
           <a:chExt cx="0" cy="0"/>
         </a:xfrm>
       </p:grpSpPr>
+      <p:pic>
+        <p:nvPicPr>
+          <p:cNvPr id="2" name="Picture 1">
+            <a:extLst>
+              <a:ext uri="{FF2B5EF4-FFF2-40B4-BE49-F238E27FC236}">
+                <a16:creationId xmlns:a16="http://schemas.microsoft.com/office/drawing/2014/main" id="{C4056C1E-D000-459F-B42A-B3E085CDA336}"/>
+              </a:ext>
+            </a:extLst>
+          </p:cNvPr>
+          <p:cNvPicPr>
+            <a:picLocks noChangeAspect="1"/>
+          </p:cNvPicPr>
+          <p:nvPr/>
+        </p:nvPicPr>
+        <p:blipFill>
+          <a:blip r:embed="rId2"/>
+          <a:stretch>
+            <a:fillRect/>
+          </a:stretch>
+        </p:blipFill>
+        <p:spPr>
+          <a:xfrm>
+            <a:off x="431442" y="447036"/>
+            <a:ext cx="11099531" cy="5963927"/>
+          </a:xfrm>
+          <a:prstGeom prst="rect">
+            <a:avLst/>
+          </a:prstGeom>
+        </p:spPr>
+      </p:pic>
+      <p:sp>
+        <p:nvSpPr>
+          <p:cNvPr id="3" name="Title 1">
+            <a:extLst>
+              <a:ext uri="{FF2B5EF4-FFF2-40B4-BE49-F238E27FC236}">
+                <a16:creationId xmlns:a16="http://schemas.microsoft.com/office/drawing/2014/main" id="{FE210960-E144-4D9A-AA47-D6B0E0EACA26}"/>
+              </a:ext>
+            </a:extLst>
+          </p:cNvPr>
+          <p:cNvSpPr>
+            <a:spLocks noGrp="1"/>
+          </p:cNvSpPr>
+          <p:nvPr>
+            <p:ph type="title"/>
+          </p:nvPr>
+        </p:nvSpPr>
+        <p:spPr>
+          <a:xfrm>
+            <a:off x="3670477" y="28641"/>
+            <a:ext cx="10065913" cy="563787"/>
+          </a:xfrm>
+        </p:spPr>
+        <p:txBody>
+          <a:bodyPr>
+            <a:normAutofit fontScale="90000"/>
+          </a:bodyPr>
+          <a:lstStyle/>
+          <a:p>
+            <a:r>
+              <a:rPr lang="tr-TR" dirty="0" err="1"/>
+              <a:t>Rin</a:t>
+            </a:r>
+            <a:r>
+              <a:rPr lang="tr-TR" dirty="0"/>
+              <a:t>=0.1</a:t>
+            </a:r>
+            <a:endParaRPr lang="en-US" dirty="0"/>
+          </a:p>
+        </p:txBody>
+      </p:sp>
     </p:spTree>
     <p:extLst>
       <p:ext uri="{BB962C8B-B14F-4D97-AF65-F5344CB8AC3E}">
-        <p14:creationId xmlns:p14="http://schemas.microsoft.com/office/powerpoint/2010/main" val="1046829486"/>
+        <p14:creationId xmlns:p14="http://schemas.microsoft.com/office/powerpoint/2010/main" val="1031344600"/>
       </p:ext>
     </p:extLst>
   </p:cSld>
@@ -6328,10 +5524,80 @@
           <a:chExt cx="0" cy="0"/>
         </a:xfrm>
       </p:grpSpPr>
+      <p:pic>
+        <p:nvPicPr>
+          <p:cNvPr id="2" name="Picture 1">
+            <a:extLst>
+              <a:ext uri="{FF2B5EF4-FFF2-40B4-BE49-F238E27FC236}">
+                <a16:creationId xmlns:a16="http://schemas.microsoft.com/office/drawing/2014/main" id="{CA0234A4-C8F5-4AD6-813C-7A379715B13B}"/>
+              </a:ext>
+            </a:extLst>
+          </p:cNvPr>
+          <p:cNvPicPr>
+            <a:picLocks noChangeAspect="1"/>
+          </p:cNvPicPr>
+          <p:nvPr/>
+        </p:nvPicPr>
+        <p:blipFill>
+          <a:blip r:embed="rId2"/>
+          <a:stretch>
+            <a:fillRect/>
+          </a:stretch>
+        </p:blipFill>
+        <p:spPr>
+          <a:xfrm>
+            <a:off x="412124" y="457199"/>
+            <a:ext cx="11256536" cy="6103061"/>
+          </a:xfrm>
+          <a:prstGeom prst="rect">
+            <a:avLst/>
+          </a:prstGeom>
+        </p:spPr>
+      </p:pic>
+      <p:sp>
+        <p:nvSpPr>
+          <p:cNvPr id="3" name="Title 1">
+            <a:extLst>
+              <a:ext uri="{FF2B5EF4-FFF2-40B4-BE49-F238E27FC236}">
+                <a16:creationId xmlns:a16="http://schemas.microsoft.com/office/drawing/2014/main" id="{94F90CE9-05A5-4270-A8D3-926D2B368903}"/>
+              </a:ext>
+            </a:extLst>
+          </p:cNvPr>
+          <p:cNvSpPr>
+            <a:spLocks noGrp="1"/>
+          </p:cNvSpPr>
+          <p:nvPr>
+            <p:ph type="title"/>
+          </p:nvPr>
+        </p:nvSpPr>
+        <p:spPr>
+          <a:xfrm>
+            <a:off x="3670477" y="28641"/>
+            <a:ext cx="6355031" cy="563787"/>
+          </a:xfrm>
+        </p:spPr>
+        <p:txBody>
+          <a:bodyPr>
+            <a:normAutofit fontScale="90000"/>
+          </a:bodyPr>
+          <a:lstStyle/>
+          <a:p>
+            <a:r>
+              <a:rPr lang="tr-TR" dirty="0" err="1"/>
+              <a:t>Rin</a:t>
+            </a:r>
+            <a:r>
+              <a:rPr lang="tr-TR" dirty="0"/>
+              <a:t>=0.1</a:t>
+            </a:r>
+            <a:endParaRPr lang="en-US" dirty="0"/>
+          </a:p>
+        </p:txBody>
+      </p:sp>
     </p:spTree>
     <p:extLst>
       <p:ext uri="{BB962C8B-B14F-4D97-AF65-F5344CB8AC3E}">
-        <p14:creationId xmlns:p14="http://schemas.microsoft.com/office/powerpoint/2010/main" val="1031344600"/>
+        <p14:creationId xmlns:p14="http://schemas.microsoft.com/office/powerpoint/2010/main" val="3103121416"/>
       </p:ext>
     </p:extLst>
   </p:cSld>

</xml_diff>